<commit_message>
Corrected errors on HOTest fact sheet
</commit_message>
<xml_diff>
--- a/resources/MTH107-HOcheatsheet.pptx
+++ b/resources/MTH107-HOcheatsheet.pptx
@@ -1493,7 +1493,7 @@
           </a:ln>
           <a:extLst>
             <a:ext uri="{C572A759-6A51-4108-AA02-DFA0A04FC94B}">
-              <ma14:wrappingTextBoxFlag xmlns="" xmlns:ma14="http://schemas.microsoft.com/office/mac/drawingml/2011/main" val="1"/>
+              <ma14:wrappingTextBoxFlag xmlns:ma14="http://schemas.microsoft.com/office/mac/drawingml/2011/main" xmlns="" val="1"/>
             </a:ext>
           </a:extLst>
         </p:spPr>
@@ -1536,7 +1536,7 @@
           </a:ln>
           <a:extLst>
             <a:ext uri="{C572A759-6A51-4108-AA02-DFA0A04FC94B}">
-              <ma14:wrappingTextBoxFlag xmlns="" xmlns:ma14="http://schemas.microsoft.com/office/mac/drawingml/2011/main" val="1"/>
+              <ma14:wrappingTextBoxFlag xmlns:ma14="http://schemas.microsoft.com/office/mac/drawingml/2011/main" xmlns="" val="1"/>
             </a:ext>
           </a:extLst>
         </p:spPr>
@@ -2026,8 +2026,8 @@
             <a:chExt cx="4393984" cy="1709195"/>
           </a:xfrm>
         </p:grpSpPr>
-        <mc:AlternateContent xmlns:mc="http://schemas.openxmlformats.org/markup-compatibility/2006">
-          <mc:Choice xmlns:a14="http://schemas.microsoft.com/office/drawing/2010/main" Requires="a14">
+        <mc:AlternateContent xmlns:mc="http://schemas.openxmlformats.org/markup-compatibility/2006" xmlns:a14="http://schemas.microsoft.com/office/drawing/2010/main">
+          <mc:Choice Requires="a14">
             <p:sp>
               <p:nvSpPr>
                 <p:cNvPr id="34" name="Shape 34"/>
@@ -2101,25 +2101,7 @@
                       <a:cs typeface="Source Sans Pro Light"/>
                       <a:sym typeface="Source Sans Pro Light"/>
                     </a:rPr>
-                    <a:t> “Distribution of </a:t>
-                  </a:r>
-                  <a:r>
-                    <a:rPr lang="en-US" sz="900" dirty="0" smtClean="0">
-                      <a:latin typeface="Source Sans Pro Light"/>
-                      <a:ea typeface="Source Sans Pro Light"/>
-                      <a:cs typeface="Source Sans Pro Light"/>
-                      <a:sym typeface="Source Sans Pro Light"/>
-                    </a:rPr>
-                    <a:t>individuals </a:t>
-                  </a:r>
-                  <a:r>
-                    <a:rPr lang="en-US" sz="900" dirty="0" smtClean="0">
-                      <a:latin typeface="Source Sans Pro Light"/>
-                      <a:ea typeface="Source Sans Pro Light"/>
-                      <a:cs typeface="Source Sans Pro Light"/>
-                      <a:sym typeface="Source Sans Pro Light"/>
-                    </a:rPr>
-                    <a:t>into response levels is the same for all populations”</a:t>
+                    <a:t> “Distribution of individuals into response levels is the same for all populations”</a:t>
                   </a:r>
                 </a:p>
                 <a:p>
@@ -2194,16 +2176,7 @@
                       <a:cs typeface="Source Sans Pro Light"/>
                       <a:sym typeface="Source Sans Pro Light"/>
                     </a:rPr>
-                    <a:t> </a:t>
-                  </a:r>
-                  <a:r>
-                    <a:rPr lang="en-US" sz="900" dirty="0" smtClean="0">
-                      <a:latin typeface="Source Sans Pro Light"/>
-                      <a:ea typeface="Source Sans Pro Light"/>
-                      <a:cs typeface="Source Sans Pro Light"/>
-                      <a:sym typeface="Source Sans Pro Light"/>
-                    </a:rPr>
-                    <a:t>into </a:t>
+                    <a:t> into </a:t>
                   </a:r>
                   <a:r>
                     <a:rPr lang="en-US" sz="900" dirty="0">
@@ -2716,7 +2689,7 @@
               </p:txBody>
             </p:sp>
           </mc:Choice>
-          <mc:Fallback>
+          <mc:Fallback xmlns="">
             <p:sp>
               <p:nvSpPr>
                 <p:cNvPr id="34" name="Shape 34"/>
@@ -2784,7 +2757,7 @@
             </a:ln>
             <a:extLst>
               <a:ext uri="{C572A759-6A51-4108-AA02-DFA0A04FC94B}">
-                <ma14:wrappingTextBoxFlag xmlns="" xmlns:ma14="http://schemas.microsoft.com/office/mac/drawingml/2011/main" val="1"/>
+                <ma14:wrappingTextBoxFlag xmlns:ma14="http://schemas.microsoft.com/office/mac/drawingml/2011/main" xmlns="" val="1"/>
               </a:ext>
             </a:extLst>
           </p:spPr>
@@ -3402,7 +3375,7 @@
             </a:ln>
             <a:extLst>
               <a:ext uri="{C572A759-6A51-4108-AA02-DFA0A04FC94B}">
-                <ma14:wrappingTextBoxFlag xmlns="" xmlns:ma14="http://schemas.microsoft.com/office/mac/drawingml/2011/main" val="1"/>
+                <ma14:wrappingTextBoxFlag xmlns:ma14="http://schemas.microsoft.com/office/mac/drawingml/2011/main" xmlns="" val="1"/>
               </a:ext>
             </a:extLst>
           </p:spPr>
@@ -3456,8 +3429,8 @@
             <a:chExt cx="4393984" cy="1650049"/>
           </a:xfrm>
         </p:grpSpPr>
-        <mc:AlternateContent xmlns:mc="http://schemas.openxmlformats.org/markup-compatibility/2006" xmlns:a14="http://schemas.microsoft.com/office/drawing/2010/main">
-          <mc:Choice Requires="a14">
+        <mc:AlternateContent xmlns:mc="http://schemas.openxmlformats.org/markup-compatibility/2006">
+          <mc:Choice xmlns:a14="http://schemas.microsoft.com/office/drawing/2010/main" Requires="a14">
             <p:sp>
               <p:nvSpPr>
                 <p:cNvPr id="54" name="Shape 34"/>
@@ -3678,7 +3651,16 @@
                       <a:cs typeface="Source Sans Pro Light"/>
                       <a:sym typeface="Source Sans Pro Light"/>
                     </a:rPr>
-                    <a:t>Test Statistic.: </a:t>
+                    <a:t>Test </a:t>
+                  </a:r>
+                  <a:r>
+                    <a:rPr lang="en-US" sz="900" b="1" dirty="0" smtClean="0">
+                      <a:latin typeface="Source Sans Pro Light"/>
+                      <a:ea typeface="Source Sans Pro Light"/>
+                      <a:cs typeface="Source Sans Pro Light"/>
+                      <a:sym typeface="Source Sans Pro Light"/>
+                    </a:rPr>
+                    <a:t>Statistic: </a:t>
                   </a:r>
                   <a14:m>
                     <m:oMath xmlns:m="http://schemas.openxmlformats.org/officeDocument/2006/math">
@@ -3686,7 +3668,7 @@
                         <m:rPr>
                           <m:sty m:val="p"/>
                         </m:rPr>
-                        <a:rPr lang="en-US" sz="1100">
+                        <a:rPr lang="en-US" sz="1000">
                           <a:latin typeface="Cambria Math" panose="02040503050406030204" pitchFamily="18" charset="0"/>
                           <a:ea typeface="Source Sans Pro Light"/>
                           <a:cs typeface="Source Sans Pro Light"/>
@@ -3695,7 +3677,7 @@
                         <m:t>t</m:t>
                       </m:r>
                       <m:r>
-                        <a:rPr lang="en-US" sz="1100" b="0" i="0" smtClean="0">
+                        <a:rPr lang="en-US" sz="1000" b="0" i="0" smtClean="0">
                           <a:latin typeface="Cambria Math" panose="02040503050406030204" pitchFamily="18" charset="0"/>
                           <a:ea typeface="Source Sans Pro Light"/>
                           <a:cs typeface="Source Sans Pro Light"/>
@@ -3706,7 +3688,7 @@
                       <m:f>
                         <m:fPr>
                           <m:ctrlPr>
-                            <a:rPr lang="en-US" sz="1100" b="0" i="1" smtClean="0">
+                            <a:rPr lang="en-US" sz="1000" b="0" i="1" smtClean="0">
                               <a:latin typeface="Cambria Math" panose="02040503050406030204" pitchFamily="18" charset="0"/>
                               <a:sym typeface="Source Sans Pro Light"/>
                             </a:rPr>
@@ -3717,7 +3699,7 @@
                             <m:accPr>
                               <m:chr m:val="̅"/>
                               <m:ctrlPr>
-                                <a:rPr lang="en-US" sz="1100" b="0" i="1" smtClean="0">
+                                <a:rPr lang="en-US" sz="1000" b="0" i="1" smtClean="0">
                                   <a:latin typeface="Cambria Math" panose="02040503050406030204" pitchFamily="18" charset="0"/>
                                   <a:sym typeface="Source Sans Pro Light"/>
                                 </a:rPr>
@@ -3728,7 +3710,7 @@
                                 <m:rPr>
                                   <m:sty m:val="p"/>
                                 </m:rPr>
-                                <a:rPr lang="en-US" sz="1100" b="0" i="0" smtClean="0">
+                                <a:rPr lang="en-US" sz="1000" b="0" i="0" smtClean="0">
                                   <a:latin typeface="Cambria Math" panose="02040503050406030204" pitchFamily="18" charset="0"/>
                                   <a:sym typeface="Source Sans Pro Light"/>
                                 </a:rPr>
@@ -3737,7 +3719,7 @@
                             </m:e>
                           </m:acc>
                           <m:r>
-                            <a:rPr lang="en-US" sz="1100" b="0" i="0" smtClean="0">
+                            <a:rPr lang="en-US" sz="1000" b="0" i="0" smtClean="0">
                               <a:latin typeface="Cambria Math" panose="02040503050406030204" pitchFamily="18" charset="0"/>
                               <a:sym typeface="Source Sans Pro Light"/>
                             </a:rPr>
@@ -3746,7 +3728,7 @@
                           <m:sSub>
                             <m:sSubPr>
                               <m:ctrlPr>
-                                <a:rPr lang="en-US" sz="1100" b="0" i="1" smtClean="0">
+                                <a:rPr lang="en-US" sz="1000" b="0" i="1" smtClean="0">
                                   <a:latin typeface="Cambria Math" panose="02040503050406030204" pitchFamily="18" charset="0"/>
                                   <a:sym typeface="Source Sans Pro Light"/>
                                 </a:rPr>
@@ -3757,7 +3739,7 @@
                                 <m:rPr>
                                   <m:sty m:val="p"/>
                                 </m:rPr>
-                                <a:rPr lang="en-US" sz="1100" b="0" i="0" smtClean="0">
+                                <a:rPr lang="en-US" sz="1000" b="0" i="0" smtClean="0">
                                   <a:latin typeface="Cambria Math" panose="02040503050406030204" pitchFamily="18" charset="0"/>
                                   <a:ea typeface="Cambria Math" panose="02040503050406030204" pitchFamily="18" charset="0"/>
                                   <a:sym typeface="Source Sans Pro Light"/>
@@ -3767,7 +3749,7 @@
                             </m:e>
                             <m:sub>
                               <m:r>
-                                <a:rPr lang="en-US" sz="1100" b="0" i="0" smtClean="0">
+                                <a:rPr lang="en-US" sz="1000" b="0" i="0" smtClean="0">
                                   <a:latin typeface="Cambria Math" panose="02040503050406030204" pitchFamily="18" charset="0"/>
                                   <a:sym typeface="Source Sans Pro Light"/>
                                 </a:rPr>
@@ -3780,7 +3762,7 @@
                           <m:box>
                             <m:boxPr>
                               <m:ctrlPr>
-                                <a:rPr lang="en-US" sz="1100" b="0" i="1" smtClean="0">
+                                <a:rPr lang="en-US" sz="1000" b="0" i="1" smtClean="0">
                                   <a:latin typeface="Cambria Math" panose="02040503050406030204" pitchFamily="18" charset="0"/>
                                   <a:sym typeface="Source Sans Pro Light"/>
                                 </a:rPr>
@@ -3793,7 +3775,7 @@
                               <m:f>
                                 <m:fPr>
                                   <m:ctrlPr>
-                                    <a:rPr lang="en-US" sz="1100" b="0" i="1" smtClean="0">
+                                    <a:rPr lang="en-US" sz="1000" b="0" i="1" smtClean="0">
                                       <a:latin typeface="Cambria Math" panose="02040503050406030204" pitchFamily="18" charset="0"/>
                                       <a:sym typeface="Source Sans Pro Light"/>
                                     </a:rPr>
@@ -3804,7 +3786,7 @@
                                     <m:rPr>
                                       <m:sty m:val="p"/>
                                     </m:rPr>
-                                    <a:rPr lang="en-US" sz="1100" b="0" i="0" smtClean="0">
+                                    <a:rPr lang="en-US" sz="1000" b="0" i="0" smtClean="0">
                                       <a:latin typeface="Cambria Math" panose="02040503050406030204" pitchFamily="18" charset="0"/>
                                       <a:sym typeface="Source Sans Pro Light"/>
                                     </a:rPr>
@@ -3812,16 +3794,30 @@
                                   </m:r>
                                 </m:num>
                                 <m:den>
-                                  <m:r>
-                                    <m:rPr>
-                                      <m:sty m:val="p"/>
-                                    </m:rPr>
-                                    <a:rPr lang="en-US" sz="1100" b="0" i="0" smtClean="0">
-                                      <a:latin typeface="Cambria Math" panose="02040503050406030204" pitchFamily="18" charset="0"/>
-                                      <a:sym typeface="Source Sans Pro Light"/>
-                                    </a:rPr>
-                                    <m:t>n</m:t>
-                                  </m:r>
+                                  <m:rad>
+                                    <m:radPr>
+                                      <m:degHide m:val="on"/>
+                                      <m:ctrlPr>
+                                        <a:rPr lang="en-US" sz="1000" b="0" i="1" smtClean="0">
+                                          <a:latin typeface="Cambria Math" panose="02040503050406030204" pitchFamily="18" charset="0"/>
+                                          <a:sym typeface="Source Sans Pro Light"/>
+                                        </a:rPr>
+                                      </m:ctrlPr>
+                                    </m:radPr>
+                                    <m:deg/>
+                                    <m:e>
+                                      <m:r>
+                                        <m:rPr>
+                                          <m:sty m:val="p"/>
+                                        </m:rPr>
+                                        <a:rPr lang="en-US" sz="1050">
+                                          <a:latin typeface="Cambria Math" panose="02040503050406030204" pitchFamily="18" charset="0"/>
+                                          <a:sym typeface="Source Sans Pro Light"/>
+                                        </a:rPr>
+                                        <m:t>n</m:t>
+                                      </m:r>
+                                    </m:e>
+                                  </m:rad>
                                 </m:den>
                               </m:f>
                             </m:e>
@@ -3947,17 +3943,32 @@
                           </m:r>
                         </m:num>
                         <m:den>
-                          <m:r>
-                            <m:rPr>
-                              <m:sty m:val="p"/>
-                            </m:rPr>
-                            <a:rPr lang="en-US" sz="1100" b="0" i="0" smtClean="0">
-                              <a:latin typeface="Cambria Math" panose="02040503050406030204" pitchFamily="18" charset="0"/>
-                              <a:ea typeface="Cambria Math" panose="02040503050406030204" pitchFamily="18" charset="0"/>
-                              <a:sym typeface="Source Sans Pro Light"/>
-                            </a:rPr>
-                            <m:t>n</m:t>
-                          </m:r>
+                          <m:rad>
+                            <m:radPr>
+                              <m:degHide m:val="on"/>
+                              <m:ctrlPr>
+                                <a:rPr lang="en-US" sz="1100" b="0" i="1" smtClean="0">
+                                  <a:latin typeface="Cambria Math" panose="02040503050406030204" pitchFamily="18" charset="0"/>
+                                  <a:ea typeface="Cambria Math" panose="02040503050406030204" pitchFamily="18" charset="0"/>
+                                  <a:sym typeface="Source Sans Pro Light"/>
+                                </a:rPr>
+                              </m:ctrlPr>
+                            </m:radPr>
+                            <m:deg/>
+                            <m:e>
+                              <m:r>
+                                <m:rPr>
+                                  <m:nor/>
+                                </m:rPr>
+                                <a:rPr lang="en-US" sz="1100" b="0" i="0" smtClean="0">
+                                  <a:latin typeface="Cambria Math" panose="02040503050406030204" pitchFamily="18" charset="0"/>
+                                  <a:ea typeface="Cambria Math" panose="02040503050406030204" pitchFamily="18" charset="0"/>
+                                  <a:sym typeface="Source Sans Pro Light"/>
+                                </a:rPr>
+                                <m:t>n</m:t>
+                              </m:r>
+                            </m:e>
+                          </m:rad>
                         </m:den>
                       </m:f>
                     </m:oMath>
@@ -4287,7 +4298,7 @@
               </p:txBody>
             </p:sp>
           </mc:Choice>
-          <mc:Fallback xmlns="">
+          <mc:Fallback>
             <p:sp>
               <p:nvSpPr>
                 <p:cNvPr id="54" name="Shape 34"/>
@@ -4355,7 +4366,7 @@
             </a:ln>
             <a:extLst>
               <a:ext uri="{C572A759-6A51-4108-AA02-DFA0A04FC94B}">
-                <ma14:wrappingTextBoxFlag xmlns="" xmlns:ma14="http://schemas.microsoft.com/office/mac/drawingml/2011/main" val="1"/>
+                <ma14:wrappingTextBoxFlag xmlns:ma14="http://schemas.microsoft.com/office/mac/drawingml/2011/main" xmlns="" val="1"/>
               </a:ext>
             </a:extLst>
           </p:spPr>
@@ -4409,8 +4420,8 @@
             <a:chExt cx="4393984" cy="2323670"/>
           </a:xfrm>
         </p:grpSpPr>
-        <mc:AlternateContent xmlns:mc="http://schemas.openxmlformats.org/markup-compatibility/2006">
-          <mc:Choice xmlns:a14="http://schemas.microsoft.com/office/drawing/2010/main" Requires="a14">
+        <mc:AlternateContent xmlns:mc="http://schemas.openxmlformats.org/markup-compatibility/2006" xmlns:a14="http://schemas.microsoft.com/office/drawing/2010/main">
+          <mc:Choice Requires="a14">
             <p:sp>
               <p:nvSpPr>
                 <p:cNvPr id="57" name="Shape 34"/>
@@ -5919,25 +5930,7 @@
                       <a:cs typeface="Source Sans Pro Light"/>
                       <a:sym typeface="Source Sans Pro Light"/>
                     </a:rPr>
-                    <a:t>1) Individuals in </a:t>
-                  </a:r>
-                  <a:r>
-                    <a:rPr lang="en-US" sz="900" dirty="0" smtClean="0">
-                      <a:latin typeface="Source Sans Pro Light"/>
-                      <a:ea typeface="Source Sans Pro Light"/>
-                      <a:cs typeface="Source Sans Pro Light"/>
-                      <a:sym typeface="Source Sans Pro Light"/>
-                    </a:rPr>
-                    <a:t>populations </a:t>
-                  </a:r>
-                  <a:r>
-                    <a:rPr lang="en-US" sz="900" dirty="0" smtClean="0">
-                      <a:latin typeface="Source Sans Pro Light"/>
-                      <a:ea typeface="Source Sans Pro Light"/>
-                      <a:cs typeface="Source Sans Pro Light"/>
-                      <a:sym typeface="Source Sans Pro Light"/>
-                    </a:rPr>
-                    <a:t>are independent</a:t>
+                    <a:t>1) Individuals in populations are independent</a:t>
                   </a:r>
                 </a:p>
                 <a:p>
@@ -6015,7 +6008,16 @@
                       <a:cs typeface="Source Sans Pro Light"/>
                       <a:sym typeface="Source Sans Pro Light"/>
                     </a:rPr>
-                    <a:t> 3) </a:t>
+                    <a:t> 3) n</a:t>
+                  </a:r>
+                  <a:r>
+                    <a:rPr lang="en-US" sz="900" baseline="-25000" dirty="0" smtClean="0">
+                      <a:latin typeface="Source Sans Pro Light"/>
+                      <a:ea typeface="Source Sans Pro Light"/>
+                      <a:cs typeface="Source Sans Pro Light"/>
+                      <a:sym typeface="Source Sans Pro Light"/>
+                    </a:rPr>
+                    <a:t>1</a:t>
                   </a:r>
                   <a:r>
                     <a:rPr lang="en-US" sz="900" dirty="0" smtClean="0">
@@ -6024,7 +6026,7 @@
                       <a:cs typeface="Source Sans Pro Light"/>
                       <a:sym typeface="Source Sans Pro Light"/>
                     </a:rPr>
-                    <a:t>n</a:t>
+                    <a:t>+n</a:t>
                   </a:r>
                   <a:r>
                     <a:rPr lang="en-US" sz="900" baseline="-25000" dirty="0" smtClean="0">
@@ -6033,7 +6035,16 @@
                       <a:cs typeface="Source Sans Pro Light"/>
                       <a:sym typeface="Source Sans Pro Light"/>
                     </a:rPr>
-                    <a:t>1</a:t>
+                    <a:t>2 </a:t>
+                  </a:r>
+                  <a:r>
+                    <a:rPr lang="en-US" sz="900" u="sng" dirty="0" smtClean="0">
+                      <a:latin typeface="Source Sans Pro Light"/>
+                      <a:ea typeface="Source Sans Pro Light"/>
+                      <a:cs typeface="Source Sans Pro Light"/>
+                      <a:sym typeface="Source Sans Pro Light"/>
+                    </a:rPr>
+                    <a:t>&gt;</a:t>
                   </a:r>
                   <a:r>
                     <a:rPr lang="en-US" sz="900" dirty="0" smtClean="0">
@@ -6042,43 +6053,7 @@
                       <a:cs typeface="Source Sans Pro Light"/>
                       <a:sym typeface="Source Sans Pro Light"/>
                     </a:rPr>
-                    <a:t>+n</a:t>
-                  </a:r>
-                  <a:r>
-                    <a:rPr lang="en-US" sz="900" baseline="-25000" dirty="0" smtClean="0">
-                      <a:latin typeface="Source Sans Pro Light"/>
-                      <a:ea typeface="Source Sans Pro Light"/>
-                      <a:cs typeface="Source Sans Pro Light"/>
-                      <a:sym typeface="Source Sans Pro Light"/>
-                    </a:rPr>
-                    <a:t>2 </a:t>
-                  </a:r>
-                  <a:r>
-                    <a:rPr lang="en-US" sz="900" u="sng" dirty="0" smtClean="0">
-                      <a:latin typeface="Source Sans Pro Light"/>
-                      <a:ea typeface="Source Sans Pro Light"/>
-                      <a:cs typeface="Source Sans Pro Light"/>
-                      <a:sym typeface="Source Sans Pro Light"/>
-                    </a:rPr>
-                    <a:t>&gt;</a:t>
-                  </a:r>
-                  <a:r>
-                    <a:rPr lang="en-US" sz="900" dirty="0" smtClean="0">
-                      <a:latin typeface="Source Sans Pro Light"/>
-                      <a:ea typeface="Source Sans Pro Light"/>
-                      <a:cs typeface="Source Sans Pro Light"/>
-                      <a:sym typeface="Source Sans Pro Light"/>
-                    </a:rPr>
-                    <a:t>40, </a:t>
-                  </a:r>
-                  <a:r>
-                    <a:rPr lang="en-US" sz="900" dirty="0" smtClean="0">
-                      <a:latin typeface="Source Sans Pro Light"/>
-                      <a:ea typeface="Source Sans Pro Light"/>
-                      <a:cs typeface="Source Sans Pro Light"/>
-                      <a:sym typeface="Source Sans Pro Light"/>
-                    </a:rPr>
-                    <a:t>n</a:t>
+                    <a:t>40, n</a:t>
                   </a:r>
                   <a:r>
                     <a:rPr lang="en-US" sz="900" baseline="-25000" dirty="0" smtClean="0">
@@ -6153,25 +6128,7 @@
                       <a:cs typeface="Source Sans Pro Light"/>
                       <a:sym typeface="Source Sans Pro Light"/>
                     </a:rPr>
-                    <a:t>             </a:t>
-                  </a:r>
-                  <a:r>
-                    <a:rPr lang="en-US" sz="900" dirty="0" smtClean="0">
-                      <a:latin typeface="Source Sans Pro Light"/>
-                      <a:ea typeface="Source Sans Pro Light"/>
-                      <a:cs typeface="Source Sans Pro Light"/>
-                      <a:sym typeface="Source Sans Pro Light"/>
-                    </a:rPr>
-                    <a:t>both </a:t>
-                  </a:r>
-                  <a:r>
-                    <a:rPr lang="en-US" sz="900" dirty="0" smtClean="0">
-                      <a:latin typeface="Source Sans Pro Light"/>
-                      <a:ea typeface="Source Sans Pro Light"/>
-                      <a:cs typeface="Source Sans Pro Light"/>
-                      <a:sym typeface="Source Sans Pro Light"/>
-                    </a:rPr>
-                    <a:t>histograms are normal</a:t>
+                    <a:t>             both histograms are normal</a:t>
                   </a:r>
                   <a:endParaRPr lang="en-US" sz="900" dirty="0">
                     <a:latin typeface="Source Sans Pro Light"/>
@@ -6330,7 +6287,7 @@
               </p:txBody>
             </p:sp>
           </mc:Choice>
-          <mc:Fallback>
+          <mc:Fallback xmlns="">
             <p:sp>
               <p:nvSpPr>
                 <p:cNvPr id="57" name="Shape 34"/>
@@ -6398,7 +6355,7 @@
             </a:ln>
             <a:extLst>
               <a:ext uri="{C572A759-6A51-4108-AA02-DFA0A04FC94B}">
-                <ma14:wrappingTextBoxFlag xmlns="" xmlns:ma14="http://schemas.microsoft.com/office/mac/drawingml/2011/main" val="1"/>
+                <ma14:wrappingTextBoxFlag xmlns:ma14="http://schemas.microsoft.com/office/mac/drawingml/2011/main" xmlns="" val="1"/>
               </a:ext>
             </a:extLst>
           </p:spPr>
@@ -6452,8 +6409,8 @@
             <a:chExt cx="4393984" cy="1463239"/>
           </a:xfrm>
         </p:grpSpPr>
-        <mc:AlternateContent xmlns:mc="http://schemas.openxmlformats.org/markup-compatibility/2006" xmlns:a14="http://schemas.microsoft.com/office/drawing/2010/main">
-          <mc:Choice Requires="a14">
+        <mc:AlternateContent xmlns:mc="http://schemas.openxmlformats.org/markup-compatibility/2006">
+          <mc:Choice xmlns:a14="http://schemas.microsoft.com/office/drawing/2010/main" Requires="a14">
             <p:sp>
               <p:nvSpPr>
                 <p:cNvPr id="59" name="Shape 34"/>
@@ -6682,7 +6639,7 @@
                         <m:rPr>
                           <m:sty m:val="p"/>
                         </m:rPr>
-                        <a:rPr lang="en-US" sz="1100" b="0" i="0" smtClean="0">
+                        <a:rPr lang="en-US" sz="1000" b="0" i="0" smtClean="0">
                           <a:latin typeface="Cambria Math" panose="02040503050406030204" pitchFamily="18" charset="0"/>
                           <a:ea typeface="Source Sans Pro Light"/>
                           <a:cs typeface="Source Sans Pro Light"/>
@@ -6691,7 +6648,7 @@
                         <m:t>Z</m:t>
                       </m:r>
                       <m:r>
-                        <a:rPr lang="en-US" sz="1100" b="0" i="0" smtClean="0">
+                        <a:rPr lang="en-US" sz="1000" b="0" i="0" smtClean="0">
                           <a:latin typeface="Cambria Math" panose="02040503050406030204" pitchFamily="18" charset="0"/>
                           <a:ea typeface="Source Sans Pro Light"/>
                           <a:cs typeface="Source Sans Pro Light"/>
@@ -6702,7 +6659,7 @@
                       <m:f>
                         <m:fPr>
                           <m:ctrlPr>
-                            <a:rPr lang="en-US" sz="1100" b="0" i="1" smtClean="0">
+                            <a:rPr lang="en-US" sz="1000" b="0" i="1" smtClean="0">
                               <a:latin typeface="Cambria Math" panose="02040503050406030204" pitchFamily="18" charset="0"/>
                               <a:sym typeface="Source Sans Pro Light"/>
                             </a:rPr>
@@ -6713,7 +6670,7 @@
                             <m:accPr>
                               <m:chr m:val="̅"/>
                               <m:ctrlPr>
-                                <a:rPr lang="en-US" sz="1100" b="0" i="1" smtClean="0">
+                                <a:rPr lang="en-US" sz="1000" b="0" i="1" smtClean="0">
                                   <a:latin typeface="Cambria Math" panose="02040503050406030204" pitchFamily="18" charset="0"/>
                                   <a:sym typeface="Source Sans Pro Light"/>
                                 </a:rPr>
@@ -6724,7 +6681,7 @@
                                 <m:rPr>
                                   <m:sty m:val="p"/>
                                 </m:rPr>
-                                <a:rPr lang="en-US" sz="1100" b="0" i="0" smtClean="0">
+                                <a:rPr lang="en-US" sz="1000" b="0" i="0" smtClean="0">
                                   <a:latin typeface="Cambria Math" panose="02040503050406030204" pitchFamily="18" charset="0"/>
                                   <a:sym typeface="Source Sans Pro Light"/>
                                 </a:rPr>
@@ -6733,7 +6690,7 @@
                             </m:e>
                           </m:acc>
                           <m:r>
-                            <a:rPr lang="en-US" sz="1100" b="0" i="0" smtClean="0">
+                            <a:rPr lang="en-US" sz="1000" b="0" i="0" smtClean="0">
                               <a:latin typeface="Cambria Math" panose="02040503050406030204" pitchFamily="18" charset="0"/>
                               <a:sym typeface="Source Sans Pro Light"/>
                             </a:rPr>
@@ -6742,7 +6699,7 @@
                           <m:sSub>
                             <m:sSubPr>
                               <m:ctrlPr>
-                                <a:rPr lang="en-US" sz="1100" b="0" i="1" smtClean="0">
+                                <a:rPr lang="en-US" sz="1000" b="0" i="1" smtClean="0">
                                   <a:latin typeface="Cambria Math" panose="02040503050406030204" pitchFamily="18" charset="0"/>
                                   <a:sym typeface="Source Sans Pro Light"/>
                                 </a:rPr>
@@ -6753,7 +6710,7 @@
                                 <m:rPr>
                                   <m:sty m:val="p"/>
                                 </m:rPr>
-                                <a:rPr lang="en-US" sz="1100" b="0" i="0" smtClean="0">
+                                <a:rPr lang="en-US" sz="1000" b="0" i="0" smtClean="0">
                                   <a:latin typeface="Cambria Math" panose="02040503050406030204" pitchFamily="18" charset="0"/>
                                   <a:ea typeface="Cambria Math" panose="02040503050406030204" pitchFamily="18" charset="0"/>
                                   <a:sym typeface="Source Sans Pro Light"/>
@@ -6763,7 +6720,7 @@
                             </m:e>
                             <m:sub>
                               <m:r>
-                                <a:rPr lang="en-US" sz="1100" b="0" i="0" smtClean="0">
+                                <a:rPr lang="en-US" sz="1000" b="0" i="0" smtClean="0">
                                   <a:latin typeface="Cambria Math" panose="02040503050406030204" pitchFamily="18" charset="0"/>
                                   <a:sym typeface="Source Sans Pro Light"/>
                                 </a:rPr>
@@ -6776,7 +6733,7 @@
                           <m:box>
                             <m:boxPr>
                               <m:ctrlPr>
-                                <a:rPr lang="en-US" sz="1100" b="0" i="1" smtClean="0">
+                                <a:rPr lang="en-US" sz="1000" b="0" i="1" smtClean="0">
                                   <a:latin typeface="Cambria Math" panose="02040503050406030204" pitchFamily="18" charset="0"/>
                                   <a:sym typeface="Source Sans Pro Light"/>
                                 </a:rPr>
@@ -6789,7 +6746,7 @@
                               <m:f>
                                 <m:fPr>
                                   <m:ctrlPr>
-                                    <a:rPr lang="en-US" sz="1100" b="0" i="1" smtClean="0">
+                                    <a:rPr lang="en-US" sz="1000" b="0" i="1" smtClean="0">
                                       <a:latin typeface="Cambria Math" panose="02040503050406030204" pitchFamily="18" charset="0"/>
                                       <a:sym typeface="Source Sans Pro Light"/>
                                     </a:rPr>
@@ -6800,7 +6757,7 @@
                                     <m:rPr>
                                       <m:sty m:val="p"/>
                                     </m:rPr>
-                                    <a:rPr lang="en-US" sz="1100" b="0" i="0" smtClean="0">
+                                    <a:rPr lang="en-US" sz="1000" b="0" i="0" smtClean="0">
                                       <a:latin typeface="Cambria Math" panose="02040503050406030204" pitchFamily="18" charset="0"/>
                                       <a:ea typeface="Cambria Math" panose="02040503050406030204" pitchFamily="18" charset="0"/>
                                       <a:sym typeface="Source Sans Pro Light"/>
@@ -6809,16 +6766,31 @@
                                   </m:r>
                                 </m:num>
                                 <m:den>
-                                  <m:r>
-                                    <m:rPr>
-                                      <m:sty m:val="p"/>
-                                    </m:rPr>
-                                    <a:rPr lang="en-US" sz="1100" b="0" i="0" smtClean="0">
-                                      <a:latin typeface="Cambria Math" panose="02040503050406030204" pitchFamily="18" charset="0"/>
-                                      <a:sym typeface="Source Sans Pro Light"/>
-                                    </a:rPr>
-                                    <m:t>n</m:t>
-                                  </m:r>
+                                  <m:rad>
+                                    <m:radPr>
+                                      <m:degHide m:val="on"/>
+                                      <m:ctrlPr>
+                                        <a:rPr lang="en-US" sz="1000" b="0" i="1" smtClean="0">
+                                          <a:latin typeface="Cambria Math" panose="02040503050406030204" pitchFamily="18" charset="0"/>
+                                          <a:ea typeface="Cambria Math" panose="02040503050406030204" pitchFamily="18" charset="0"/>
+                                          <a:sym typeface="Source Sans Pro Light"/>
+                                        </a:rPr>
+                                      </m:ctrlPr>
+                                    </m:radPr>
+                                    <m:deg/>
+                                    <m:e>
+                                      <m:r>
+                                        <m:rPr>
+                                          <m:sty m:val="p"/>
+                                        </m:rPr>
+                                        <a:rPr lang="en-US" sz="1000">
+                                          <a:latin typeface="Cambria Math" panose="02040503050406030204" pitchFamily="18" charset="0"/>
+                                          <a:sym typeface="Source Sans Pro Light"/>
+                                        </a:rPr>
+                                        <m:t>n</m:t>
+                                      </m:r>
+                                    </m:e>
+                                  </m:rad>
                                 </m:den>
                               </m:f>
                             </m:e>
@@ -6935,17 +6907,32 @@
                           </m:r>
                         </m:num>
                         <m:den>
-                          <m:r>
-                            <m:rPr>
-                              <m:sty m:val="p"/>
-                            </m:rPr>
-                            <a:rPr lang="en-US" sz="1200" b="0" i="0" smtClean="0">
-                              <a:latin typeface="Cambria Math" panose="02040503050406030204" pitchFamily="18" charset="0"/>
-                              <a:ea typeface="Cambria Math" panose="02040503050406030204" pitchFamily="18" charset="0"/>
-                              <a:sym typeface="Source Sans Pro Light"/>
-                            </a:rPr>
-                            <m:t>n</m:t>
-                          </m:r>
+                          <m:rad>
+                            <m:radPr>
+                              <m:degHide m:val="on"/>
+                              <m:ctrlPr>
+                                <a:rPr lang="en-US" sz="1200" i="1" smtClean="0">
+                                  <a:latin typeface="Cambria Math" panose="02040503050406030204" pitchFamily="18" charset="0"/>
+                                  <a:ea typeface="Cambria Math" panose="02040503050406030204" pitchFamily="18" charset="0"/>
+                                  <a:sym typeface="Source Sans Pro Light"/>
+                                </a:rPr>
+                              </m:ctrlPr>
+                            </m:radPr>
+                            <m:deg/>
+                            <m:e>
+                              <m:r>
+                                <m:rPr>
+                                  <m:sty m:val="p"/>
+                                </m:rPr>
+                                <a:rPr lang="en-US" sz="1200">
+                                  <a:latin typeface="Cambria Math" panose="02040503050406030204" pitchFamily="18" charset="0"/>
+                                  <a:ea typeface="Cambria Math" panose="02040503050406030204" pitchFamily="18" charset="0"/>
+                                  <a:sym typeface="Source Sans Pro Light"/>
+                                </a:rPr>
+                                <m:t>n</m:t>
+                              </m:r>
+                            </m:e>
+                          </m:rad>
                         </m:den>
                       </m:f>
                     </m:oMath>
@@ -7200,7 +7187,7 @@
               </p:txBody>
             </p:sp>
           </mc:Choice>
-          <mc:Fallback xmlns="">
+          <mc:Fallback>
             <p:sp>
               <p:nvSpPr>
                 <p:cNvPr id="59" name="Shape 34"/>
@@ -7222,7 +7209,7 @@
                 <a:blipFill rotWithShape="0">
                   <a:blip r:embed="rId6"/>
                   <a:stretch>
-                    <a:fillRect l="-556" b="-943"/>
+                    <a:fillRect l="-556"/>
                   </a:stretch>
                 </a:blipFill>
                 <a:ln w="12700">
@@ -7268,7 +7255,7 @@
             </a:ln>
             <a:extLst>
               <a:ext uri="{C572A759-6A51-4108-AA02-DFA0A04FC94B}">
-                <ma14:wrappingTextBoxFlag xmlns="" xmlns:ma14="http://schemas.microsoft.com/office/mac/drawingml/2011/main" val="1"/>
+                <ma14:wrappingTextBoxFlag xmlns:ma14="http://schemas.microsoft.com/office/mac/drawingml/2011/main" xmlns="" val="1"/>
               </a:ext>
             </a:extLst>
           </p:spPr>
@@ -7322,8 +7309,8 @@
             <a:chExt cx="4393984" cy="1864063"/>
           </a:xfrm>
         </p:grpSpPr>
-        <mc:AlternateContent xmlns:mc="http://schemas.openxmlformats.org/markup-compatibility/2006">
-          <mc:Choice xmlns:a14="http://schemas.microsoft.com/office/drawing/2010/main" Requires="a14">
+        <mc:AlternateContent xmlns:mc="http://schemas.openxmlformats.org/markup-compatibility/2006" xmlns:a14="http://schemas.microsoft.com/office/drawing/2010/main">
+          <mc:Choice Requires="a14">
             <p:sp>
               <p:nvSpPr>
                 <p:cNvPr id="63" name="Shape 34"/>
@@ -7415,16 +7402,7 @@
                       <a:cs typeface="Source Sans Pro Light"/>
                       <a:sym typeface="Source Sans Pro Light"/>
                     </a:rPr>
-                    <a:t> </a:t>
-                  </a:r>
-                  <a:r>
-                    <a:rPr lang="en-US" sz="900" dirty="0" smtClean="0">
-                      <a:latin typeface="Source Sans Pro Light"/>
-                      <a:ea typeface="Source Sans Pro Light"/>
-                      <a:cs typeface="Source Sans Pro Light"/>
-                      <a:sym typeface="Source Sans Pro Light"/>
-                    </a:rPr>
-                    <a:t>into response levels follows the theoretical distribution”</a:t>
+                    <a:t> into response levels follows the theoretical distribution”</a:t>
                   </a:r>
                 </a:p>
                 <a:p>
@@ -7499,16 +7477,7 @@
                       <a:cs typeface="Source Sans Pro Light"/>
                       <a:sym typeface="Source Sans Pro Light"/>
                     </a:rPr>
-                    <a:t> </a:t>
-                  </a:r>
-                  <a:r>
-                    <a:rPr lang="en-US" sz="900" dirty="0" smtClean="0">
-                      <a:latin typeface="Source Sans Pro Light"/>
-                      <a:ea typeface="Source Sans Pro Light"/>
-                      <a:cs typeface="Source Sans Pro Light"/>
-                      <a:sym typeface="Source Sans Pro Light"/>
-                    </a:rPr>
-                    <a:t>into </a:t>
+                    <a:t> into </a:t>
                   </a:r>
                   <a:r>
                     <a:rPr lang="en-US" sz="900" dirty="0">
@@ -8117,7 +8086,7 @@
               </p:txBody>
             </p:sp>
           </mc:Choice>
-          <mc:Fallback>
+          <mc:Fallback xmlns="">
             <p:sp>
               <p:nvSpPr>
                 <p:cNvPr id="63" name="Shape 34"/>
@@ -8185,7 +8154,7 @@
             </a:ln>
             <a:extLst>
               <a:ext uri="{C572A759-6A51-4108-AA02-DFA0A04FC94B}">
-                <ma14:wrappingTextBoxFlag xmlns="" xmlns:ma14="http://schemas.microsoft.com/office/mac/drawingml/2011/main" val="1"/>
+                <ma14:wrappingTextBoxFlag xmlns:ma14="http://schemas.microsoft.com/office/mac/drawingml/2011/main" xmlns="" val="1"/>
               </a:ext>
             </a:extLst>
           </p:spPr>
@@ -8557,7 +8526,7 @@
             </a:ln>
             <a:extLst>
               <a:ext uri="{C572A759-6A51-4108-AA02-DFA0A04FC94B}">
-                <ma14:wrappingTextBoxFlag xmlns="" xmlns:ma14="http://schemas.microsoft.com/office/mac/drawingml/2011/main" val="1"/>
+                <ma14:wrappingTextBoxFlag xmlns:ma14="http://schemas.microsoft.com/office/mac/drawingml/2011/main" xmlns="" val="1"/>
               </a:ext>
             </a:extLst>
           </p:spPr>

</xml_diff>